<commit_message>
Agregué el SO Cloud
</commit_message>
<xml_diff>
--- a/DiaposEOP.pptx
+++ b/DiaposEOP.pptx
@@ -5,10 +5,10 @@
     <p:sldMasterId id="2147483648" r:id="rId1"/>
   </p:sldMasterIdLst>
   <p:notesMasterIdLst>
-    <p:notesMasterId r:id="rId8"/>
+    <p:notesMasterId r:id="rId11"/>
   </p:notesMasterIdLst>
   <p:handoutMasterIdLst>
-    <p:handoutMasterId r:id="rId9"/>
+    <p:handoutMasterId r:id="rId12"/>
   </p:handoutMasterIdLst>
   <p:sldIdLst>
     <p:sldId id="256" r:id="rId2"/>
@@ -16,7 +16,10 @@
     <p:sldId id="259" r:id="rId4"/>
     <p:sldId id="260" r:id="rId5"/>
     <p:sldId id="261" r:id="rId6"/>
-    <p:sldId id="257" r:id="rId7"/>
+    <p:sldId id="263" r:id="rId7"/>
+    <p:sldId id="262" r:id="rId8"/>
+    <p:sldId id="264" r:id="rId9"/>
+    <p:sldId id="257" r:id="rId10"/>
   </p:sldIdLst>
   <p:sldSz cx="9144000" cy="6858000" type="screen4x3"/>
   <p:notesSz cx="6858000" cy="9144000"/>
@@ -215,7 +218,7 @@
           </a:lstStyle>
           <a:p>
             <a:fld id="{07AD6534-C742-354C-BB66-68810E77E9F5}" type="datetimeFigureOut">
-              <a:t>26/2/2023</a:t>
+              <a:t>27/2/2023</a:t>
             </a:fld>
             <a:endParaRPr lang="es-ES_tradnl"/>
           </a:p>
@@ -379,7 +382,7 @@
           </a:lstStyle>
           <a:p>
             <a:fld id="{07905298-8F91-C746-AB8F-A91C855DEE53}" type="datetimeFigureOut">
-              <a:t>26/2/2023</a:t>
+              <a:t>27/2/2023</a:t>
             </a:fld>
             <a:endParaRPr lang="es-ES_tradnl"/>
           </a:p>
@@ -710,7 +713,7 @@
           <a:lstStyle/>
           <a:p>
             <a:fld id="{456E474B-3F58-9C40-A6B3-4A73416EC76F}" type="datetime3">
-              <a:t>26.2.23</a:t>
+              <a:t>27.2.23</a:t>
             </a:fld>
             <a:endParaRPr lang="es-ES_tradnl"/>
           </a:p>
@@ -1095,7 +1098,7 @@
           <a:lstStyle/>
           <a:p>
             <a:fld id="{15A78907-2BAF-DD49-AEA9-4871CF3394D0}" type="datetime3">
-              <a:t>26.2.23</a:t>
+              <a:t>27.2.23</a:t>
             </a:fld>
             <a:endParaRPr lang="es-ES_tradnl"/>
           </a:p>
@@ -1188,7 +1191,7 @@
           <a:lstStyle/>
           <a:p>
             <a:fld id="{456E474B-3F58-9C40-A6B3-4A73416EC76F}" type="datetime3">
-              <a:t>26.2.23</a:t>
+              <a:t>27.2.23</a:t>
             </a:fld>
             <a:endParaRPr lang="es-ES_tradnl"/>
           </a:p>
@@ -1555,7 +1558,7 @@
           <a:lstStyle/>
           <a:p>
             <a:fld id="{74593B66-1C04-AC46-930F-FBBE61D032B0}" type="datetime3">
-              <a:t>26.2.23</a:t>
+              <a:t>27.2.23</a:t>
             </a:fld>
             <a:endParaRPr lang="es-ES_tradnl"/>
           </a:p>
@@ -1721,7 +1724,7 @@
           <a:lstStyle/>
           <a:p>
             <a:fld id="{35ACACDB-EA2E-354D-B6B5-978EAE165E52}" type="datetime3">
-              <a:t>26.2.23</a:t>
+              <a:t>27.2.23</a:t>
             </a:fld>
             <a:endParaRPr lang="es-ES_tradnl"/>
           </a:p>
@@ -1964,7 +1967,7 @@
           <a:lstStyle/>
           <a:p>
             <a:fld id="{E62EFDE8-7EB4-6646-BACE-4A157103812E}" type="datetime3">
-              <a:t>26.2.23</a:t>
+              <a:t>27.2.23</a:t>
             </a:fld>
             <a:endParaRPr lang="es-ES_tradnl"/>
           </a:p>
@@ -2247,7 +2250,7 @@
           <a:lstStyle/>
           <a:p>
             <a:fld id="{F47C4522-085F-BA4F-891F-B1D61EE1B27D}" type="datetime3">
-              <a:t>26.2.23</a:t>
+              <a:t>27.2.23</a:t>
             </a:fld>
             <a:endParaRPr lang="es-ES_tradnl"/>
           </a:p>
@@ -2672,7 +2675,7 @@
           <a:lstStyle/>
           <a:p>
             <a:fld id="{1DABA6E6-4DF2-DC44-9EB7-2753A1C16D2C}" type="datetime3">
-              <a:t>26.2.23</a:t>
+              <a:t>27.2.23</a:t>
             </a:fld>
             <a:endParaRPr lang="es-ES_tradnl"/>
           </a:p>
@@ -2787,7 +2790,7 @@
           <a:lstStyle/>
           <a:p>
             <a:fld id="{6985B749-8A09-CE4E-A4F9-D8371D66B945}" type="datetime3">
-              <a:t>26.2.23</a:t>
+              <a:t>27.2.23</a:t>
             </a:fld>
             <a:endParaRPr lang="es-ES_tradnl"/>
           </a:p>
@@ -2880,7 +2883,7 @@
           <a:lstStyle/>
           <a:p>
             <a:fld id="{2E05747F-1220-114D-B2D7-A4C19409BDD4}" type="datetime3">
-              <a:t>26.2.23</a:t>
+              <a:t>27.2.23</a:t>
             </a:fld>
             <a:endParaRPr lang="es-ES_tradnl"/>
           </a:p>
@@ -3153,7 +3156,7 @@
           <a:lstStyle/>
           <a:p>
             <a:fld id="{800DC525-4F4B-E94D-BC44-B8040DFED965}" type="datetime3">
-              <a:t>26.2.23</a:t>
+              <a:t>27.2.23</a:t>
             </a:fld>
             <a:endParaRPr lang="es-ES_tradnl"/>
           </a:p>
@@ -3388,7 +3391,7 @@
           </a:lstStyle>
           <a:p>
             <a:fld id="{456E474B-3F58-9C40-A6B3-4A73416EC76F}" type="datetime3">
-              <a:t>26.2.23</a:t>
+              <a:t>27.2.23</a:t>
             </a:fld>
             <a:endParaRPr lang="es-ES_tradnl"/>
           </a:p>
@@ -3983,7 +3986,7 @@
           <a:lstStyle/>
           <a:p>
             <a:fld id="{35ACACDB-EA2E-354D-B6B5-978EAE165E52}" type="datetime3">
-              <a:t>26.2.23</a:t>
+              <a:t>27.2.23</a:t>
             </a:fld>
             <a:endParaRPr lang="es-ES_tradnl"/>
           </a:p>
@@ -4314,7 +4317,7 @@
           <a:lstStyle/>
           <a:p>
             <a:fld id="{35ACACDB-EA2E-354D-B6B5-978EAE165E52}" type="datetime3">
-              <a:t>26.2.23</a:t>
+              <a:t>27.2.23</a:t>
             </a:fld>
             <a:endParaRPr lang="es-ES_tradnl"/>
           </a:p>
@@ -4507,7 +4510,7 @@
           <a:lstStyle/>
           <a:p>
             <a:fld id="{35ACACDB-EA2E-354D-B6B5-978EAE165E52}" type="datetime3">
-              <a:t>26.2.23</a:t>
+              <a:t>27.2.23</a:t>
             </a:fld>
             <a:endParaRPr lang="es-ES_tradnl"/>
           </a:p>
@@ -4691,7 +4694,7 @@
           <a:lstStyle/>
           <a:p>
             <a:fld id="{35ACACDB-EA2E-354D-B6B5-978EAE165E52}" type="datetime3">
-              <a:t>26.2.23</a:t>
+              <a:t>27.2.23</a:t>
             </a:fld>
             <a:endParaRPr lang="es-ES_tradnl"/>
           </a:p>
@@ -4805,6 +4808,710 @@
       </p:grpSpPr>
       <p:sp>
         <p:nvSpPr>
+          <p:cNvPr id="2" name="Título 1"/>
+          <p:cNvSpPr>
+            <a:spLocks noGrp="1"/>
+          </p:cNvSpPr>
+          <p:nvPr>
+            <p:ph type="title"/>
+          </p:nvPr>
+        </p:nvSpPr>
+        <p:spPr/>
+        <p:txBody>
+          <a:bodyPr/>
+          <a:lstStyle/>
+          <a:p>
+            <a:r>
+              <a:rPr lang="es-ES_tradnl" dirty="0" smtClean="0"/>
+              <a:t>CLOUD OPERATING SYSTEM</a:t>
+            </a:r>
+            <a:endParaRPr lang="es-ES_tradnl" dirty="0"/>
+          </a:p>
+        </p:txBody>
+      </p:sp>
+      <p:sp>
+        <p:nvSpPr>
+          <p:cNvPr id="3" name="Marcador de contenido 2"/>
+          <p:cNvSpPr>
+            <a:spLocks noGrp="1"/>
+          </p:cNvSpPr>
+          <p:nvPr>
+            <p:ph idx="1"/>
+          </p:nvPr>
+        </p:nvSpPr>
+        <p:spPr>
+          <a:xfrm>
+            <a:off x="101600" y="1444979"/>
+            <a:ext cx="8902700" cy="1111609"/>
+          </a:xfrm>
+        </p:spPr>
+        <p:txBody>
+          <a:bodyPr/>
+          <a:lstStyle/>
+          <a:p>
+            <a:r>
+              <a:rPr lang="en-US" dirty="0">
+                <a:latin typeface="Arial" panose="020B0604020202020204" pitchFamily="34" charset="0"/>
+                <a:cs typeface="Arial" panose="020B0604020202020204" pitchFamily="34" charset="0"/>
+              </a:rPr>
+              <a:t>The cloud operating system (cloud OS) is used for managing the cloud resources such that they can be used</a:t>
+            </a:r>
+          </a:p>
+          <a:p>
+            <a:r>
+              <a:rPr lang="en-US" dirty="0">
+                <a:latin typeface="Arial" panose="020B0604020202020204" pitchFamily="34" charset="0"/>
+                <a:cs typeface="Arial" panose="020B0604020202020204" pitchFamily="34" charset="0"/>
+              </a:rPr>
+              <a:t>effectively and efficiently.</a:t>
+            </a:r>
+            <a:endParaRPr lang="en-US" dirty="0" smtClean="0">
+              <a:latin typeface="Arial" panose="020B0604020202020204" pitchFamily="34" charset="0"/>
+              <a:cs typeface="Arial" panose="020B0604020202020204" pitchFamily="34" charset="0"/>
+            </a:endParaRPr>
+          </a:p>
+        </p:txBody>
+      </p:sp>
+      <p:sp>
+        <p:nvSpPr>
+          <p:cNvPr id="4" name="Marcador de fecha 3"/>
+          <p:cNvSpPr>
+            <a:spLocks noGrp="1"/>
+          </p:cNvSpPr>
+          <p:nvPr>
+            <p:ph type="dt" sz="half" idx="10"/>
+          </p:nvPr>
+        </p:nvSpPr>
+        <p:spPr/>
+        <p:txBody>
+          <a:bodyPr/>
+          <a:lstStyle/>
+          <a:p>
+            <a:fld id="{35ACACDB-EA2E-354D-B6B5-978EAE165E52}" type="datetime3">
+              <a:t>27.2.23</a:t>
+            </a:fld>
+            <a:endParaRPr lang="es-ES_tradnl"/>
+          </a:p>
+        </p:txBody>
+      </p:sp>
+      <p:sp>
+        <p:nvSpPr>
+          <p:cNvPr id="5" name="Marcador de número de diapositiva 4"/>
+          <p:cNvSpPr>
+            <a:spLocks noGrp="1"/>
+          </p:cNvSpPr>
+          <p:nvPr>
+            <p:ph type="sldNum" sz="quarter" idx="12"/>
+          </p:nvPr>
+        </p:nvSpPr>
+        <p:spPr/>
+        <p:txBody>
+          <a:bodyPr/>
+          <a:lstStyle/>
+          <a:p>
+            <a:fld id="{47E163D4-D484-AC4B-B1E7-22F25D50FAE6}" type="slidenum">
+              <a:t>6</a:t>
+            </a:fld>
+            <a:endParaRPr lang="es-ES_tradnl"/>
+          </a:p>
+        </p:txBody>
+      </p:sp>
+      <p:sp>
+        <p:nvSpPr>
+          <p:cNvPr id="7" name="Marcador de contenido 2"/>
+          <p:cNvSpPr txBox="1">
+            <a:spLocks/>
+          </p:cNvSpPr>
+          <p:nvPr/>
+        </p:nvSpPr>
+        <p:spPr>
+          <a:xfrm>
+            <a:off x="101600" y="2556588"/>
+            <a:ext cx="5058229" cy="2283522"/>
+          </a:xfrm>
+          <a:prstGeom prst="rect">
+            <a:avLst/>
+          </a:prstGeom>
+        </p:spPr>
+        <p:txBody>
+          <a:bodyPr vert="horz" lIns="91440" tIns="45720" rIns="91440" bIns="45720" rtlCol="0">
+            <a:noAutofit/>
+          </a:bodyPr>
+          <a:lstStyle>
+            <a:lvl1pPr marL="342900" indent="-342900" algn="l" defTabSz="457200" rtl="0" eaLnBrk="1" latinLnBrk="0" hangingPunct="1">
+              <a:spcBef>
+                <a:spcPts val="0"/>
+              </a:spcBef>
+              <a:buFont typeface="Arial"/>
+              <a:buChar char="•"/>
+              <a:defRPr sz="2000" kern="1200">
+                <a:solidFill>
+                  <a:schemeClr val="tx1"/>
+                </a:solidFill>
+                <a:latin typeface="+mn-lt"/>
+                <a:ea typeface="+mn-ea"/>
+                <a:cs typeface="+mn-cs"/>
+              </a:defRPr>
+            </a:lvl1pPr>
+            <a:lvl2pPr marL="742950" indent="-285750" algn="l" defTabSz="457200" rtl="0" eaLnBrk="1" latinLnBrk="0" hangingPunct="1">
+              <a:spcBef>
+                <a:spcPts val="0"/>
+              </a:spcBef>
+              <a:buFont typeface="Arial"/>
+              <a:buChar char="–"/>
+              <a:defRPr sz="2000" kern="1200">
+                <a:solidFill>
+                  <a:schemeClr val="tx1"/>
+                </a:solidFill>
+                <a:latin typeface="+mn-lt"/>
+                <a:ea typeface="+mn-ea"/>
+                <a:cs typeface="+mn-cs"/>
+              </a:defRPr>
+            </a:lvl2pPr>
+            <a:lvl3pPr marL="1143000" indent="-228600" algn="l" defTabSz="457200" rtl="0" eaLnBrk="1" latinLnBrk="0" hangingPunct="1">
+              <a:spcBef>
+                <a:spcPts val="0"/>
+              </a:spcBef>
+              <a:buFont typeface="Arial"/>
+              <a:buChar char="•"/>
+              <a:defRPr sz="2000" kern="1200">
+                <a:solidFill>
+                  <a:schemeClr val="tx1"/>
+                </a:solidFill>
+                <a:latin typeface="+mn-lt"/>
+                <a:ea typeface="+mn-ea"/>
+                <a:cs typeface="+mn-cs"/>
+              </a:defRPr>
+            </a:lvl3pPr>
+            <a:lvl4pPr marL="1600200" indent="-228600" algn="l" defTabSz="457200" rtl="0" eaLnBrk="1" latinLnBrk="0" hangingPunct="1">
+              <a:spcBef>
+                <a:spcPts val="0"/>
+              </a:spcBef>
+              <a:buFont typeface="Arial"/>
+              <a:buChar char="–"/>
+              <a:defRPr sz="2000" kern="1200">
+                <a:solidFill>
+                  <a:schemeClr val="tx1"/>
+                </a:solidFill>
+                <a:latin typeface="+mn-lt"/>
+                <a:ea typeface="+mn-ea"/>
+                <a:cs typeface="+mn-cs"/>
+              </a:defRPr>
+            </a:lvl4pPr>
+            <a:lvl5pPr marL="2057400" indent="-228600" algn="l" defTabSz="457200" rtl="0" eaLnBrk="1" latinLnBrk="0" hangingPunct="1">
+              <a:spcBef>
+                <a:spcPts val="0"/>
+              </a:spcBef>
+              <a:buFont typeface="Arial"/>
+              <a:buChar char="»"/>
+              <a:defRPr sz="2000" kern="1200">
+                <a:solidFill>
+                  <a:schemeClr val="tx1"/>
+                </a:solidFill>
+                <a:latin typeface="+mn-lt"/>
+                <a:ea typeface="+mn-ea"/>
+                <a:cs typeface="+mn-cs"/>
+              </a:defRPr>
+            </a:lvl5pPr>
+            <a:lvl6pPr marL="2514600" indent="-228600" algn="l" defTabSz="457200" rtl="0" eaLnBrk="1" latinLnBrk="0" hangingPunct="1">
+              <a:spcBef>
+                <a:spcPct val="20000"/>
+              </a:spcBef>
+              <a:buFont typeface="Arial"/>
+              <a:buChar char="•"/>
+              <a:defRPr sz="2000" kern="1200">
+                <a:solidFill>
+                  <a:schemeClr val="tx1"/>
+                </a:solidFill>
+                <a:latin typeface="+mn-lt"/>
+                <a:ea typeface="+mn-ea"/>
+                <a:cs typeface="+mn-cs"/>
+              </a:defRPr>
+            </a:lvl6pPr>
+            <a:lvl7pPr marL="2971800" indent="-228600" algn="l" defTabSz="457200" rtl="0" eaLnBrk="1" latinLnBrk="0" hangingPunct="1">
+              <a:spcBef>
+                <a:spcPct val="20000"/>
+              </a:spcBef>
+              <a:buFont typeface="Arial"/>
+              <a:buChar char="•"/>
+              <a:defRPr sz="2000" kern="1200">
+                <a:solidFill>
+                  <a:schemeClr val="tx1"/>
+                </a:solidFill>
+                <a:latin typeface="+mn-lt"/>
+                <a:ea typeface="+mn-ea"/>
+                <a:cs typeface="+mn-cs"/>
+              </a:defRPr>
+            </a:lvl7pPr>
+            <a:lvl8pPr marL="3429000" indent="-228600" algn="l" defTabSz="457200" rtl="0" eaLnBrk="1" latinLnBrk="0" hangingPunct="1">
+              <a:spcBef>
+                <a:spcPct val="20000"/>
+              </a:spcBef>
+              <a:buFont typeface="Arial"/>
+              <a:buChar char="•"/>
+              <a:defRPr sz="2000" kern="1200">
+                <a:solidFill>
+                  <a:schemeClr val="tx1"/>
+                </a:solidFill>
+                <a:latin typeface="+mn-lt"/>
+                <a:ea typeface="+mn-ea"/>
+                <a:cs typeface="+mn-cs"/>
+              </a:defRPr>
+            </a:lvl8pPr>
+            <a:lvl9pPr marL="3886200" indent="-228600" algn="l" defTabSz="457200" rtl="0" eaLnBrk="1" latinLnBrk="0" hangingPunct="1">
+              <a:spcBef>
+                <a:spcPct val="20000"/>
+              </a:spcBef>
+              <a:buFont typeface="Arial"/>
+              <a:buChar char="•"/>
+              <a:defRPr sz="2000" kern="1200">
+                <a:solidFill>
+                  <a:schemeClr val="tx1"/>
+                </a:solidFill>
+                <a:latin typeface="+mn-lt"/>
+                <a:ea typeface="+mn-ea"/>
+                <a:cs typeface="+mn-cs"/>
+              </a:defRPr>
+            </a:lvl9pPr>
+          </a:lstStyle>
+          <a:p>
+            <a:r>
+              <a:rPr lang="en-US" dirty="0">
+                <a:latin typeface="Arial" panose="020B0604020202020204" pitchFamily="34" charset="0"/>
+                <a:cs typeface="Arial" panose="020B0604020202020204" pitchFamily="34" charset="0"/>
+              </a:rPr>
+              <a:t>And also it is the duty of cloud OS to provide convenient interface for users and </a:t>
+            </a:r>
+            <a:r>
+              <a:rPr lang="en-US" dirty="0" smtClean="0">
+                <a:latin typeface="Arial" panose="020B0604020202020204" pitchFamily="34" charset="0"/>
+                <a:cs typeface="Arial" panose="020B0604020202020204" pitchFamily="34" charset="0"/>
+              </a:rPr>
+              <a:t>applications.</a:t>
+            </a:r>
+            <a:endParaRPr lang="es-ES_tradnl" dirty="0"/>
+          </a:p>
+        </p:txBody>
+      </p:sp>
+      <p:pic>
+        <p:nvPicPr>
+          <p:cNvPr id="8" name="Imagen 7"/>
+          <p:cNvPicPr>
+            <a:picLocks noChangeAspect="1"/>
+          </p:cNvPicPr>
+          <p:nvPr/>
+        </p:nvPicPr>
+        <p:blipFill>
+          <a:blip r:embed="rId2">
+            <a:extLst>
+              <a:ext uri="{28A0092B-C50C-407E-A947-70E740481C1C}">
+                <a14:useLocalDpi xmlns:a14="http://schemas.microsoft.com/office/drawing/2010/main" val="0"/>
+              </a:ext>
+            </a:extLst>
+          </a:blip>
+          <a:stretch>
+            <a:fillRect/>
+          </a:stretch>
+        </p:blipFill>
+        <p:spPr>
+          <a:xfrm>
+            <a:off x="5159829" y="2194557"/>
+            <a:ext cx="3403070" cy="2996181"/>
+          </a:xfrm>
+          <a:prstGeom prst="rect">
+            <a:avLst/>
+          </a:prstGeom>
+        </p:spPr>
+      </p:pic>
+    </p:spTree>
+    <p:extLst>
+      <p:ext uri="{BB962C8B-B14F-4D97-AF65-F5344CB8AC3E}">
+        <p14:creationId xmlns:p14="http://schemas.microsoft.com/office/powerpoint/2010/main" val="1664204975"/>
+      </p:ext>
+    </p:extLst>
+  </p:cSld>
+  <p:clrMapOvr>
+    <a:masterClrMapping/>
+  </p:clrMapOvr>
+</p:sld>
+</file>
+
+<file path=ppt/slides/slide7.xml><?xml version="1.0" encoding="utf-8"?>
+<p:sld xmlns:a="http://schemas.openxmlformats.org/drawingml/2006/main" xmlns:r="http://schemas.openxmlformats.org/officeDocument/2006/relationships" xmlns:p="http://schemas.openxmlformats.org/presentationml/2006/main">
+  <p:cSld>
+    <p:spTree>
+      <p:nvGrpSpPr>
+        <p:cNvPr id="1" name=""/>
+        <p:cNvGrpSpPr/>
+        <p:nvPr/>
+      </p:nvGrpSpPr>
+      <p:grpSpPr>
+        <a:xfrm>
+          <a:off x="0" y="0"/>
+          <a:ext cx="0" cy="0"/>
+          <a:chOff x="0" y="0"/>
+          <a:chExt cx="0" cy="0"/>
+        </a:xfrm>
+      </p:grpSpPr>
+      <p:sp>
+        <p:nvSpPr>
+          <p:cNvPr id="2" name="Título 1"/>
+          <p:cNvSpPr>
+            <a:spLocks noGrp="1"/>
+          </p:cNvSpPr>
+          <p:nvPr>
+            <p:ph type="title"/>
+          </p:nvPr>
+        </p:nvSpPr>
+        <p:spPr/>
+        <p:txBody>
+          <a:bodyPr/>
+          <a:lstStyle/>
+          <a:p>
+            <a:r>
+              <a:rPr lang="es-ES_tradnl" dirty="0" smtClean="0"/>
+              <a:t>UNIX</a:t>
+            </a:r>
+            <a:endParaRPr lang="es-ES_tradnl" dirty="0"/>
+          </a:p>
+        </p:txBody>
+      </p:sp>
+      <p:sp>
+        <p:nvSpPr>
+          <p:cNvPr id="4" name="Marcador de fecha 3"/>
+          <p:cNvSpPr>
+            <a:spLocks noGrp="1"/>
+          </p:cNvSpPr>
+          <p:nvPr>
+            <p:ph type="dt" sz="half" idx="10"/>
+          </p:nvPr>
+        </p:nvSpPr>
+        <p:spPr/>
+        <p:txBody>
+          <a:bodyPr/>
+          <a:lstStyle/>
+          <a:p>
+            <a:fld id="{35ACACDB-EA2E-354D-B6B5-978EAE165E52}" type="datetime3">
+              <a:t>27.2.23</a:t>
+            </a:fld>
+            <a:endParaRPr lang="es-ES_tradnl"/>
+          </a:p>
+        </p:txBody>
+      </p:sp>
+      <p:sp>
+        <p:nvSpPr>
+          <p:cNvPr id="5" name="Marcador de número de diapositiva 4"/>
+          <p:cNvSpPr>
+            <a:spLocks noGrp="1"/>
+          </p:cNvSpPr>
+          <p:nvPr>
+            <p:ph type="sldNum" sz="quarter" idx="12"/>
+          </p:nvPr>
+        </p:nvSpPr>
+        <p:spPr/>
+        <p:txBody>
+          <a:bodyPr/>
+          <a:lstStyle/>
+          <a:p>
+            <a:fld id="{47E163D4-D484-AC4B-B1E7-22F25D50FAE6}" type="slidenum">
+              <a:t>7</a:t>
+            </a:fld>
+            <a:endParaRPr lang="es-ES_tradnl"/>
+          </a:p>
+        </p:txBody>
+      </p:sp>
+      <p:sp>
+        <p:nvSpPr>
+          <p:cNvPr id="10" name="CuadroTexto 9"/>
+          <p:cNvSpPr txBox="1"/>
+          <p:nvPr/>
+        </p:nvSpPr>
+        <p:spPr>
+          <a:xfrm>
+            <a:off x="347383" y="1361198"/>
+            <a:ext cx="2662518" cy="3970318"/>
+          </a:xfrm>
+          <a:prstGeom prst="rect">
+            <a:avLst/>
+          </a:prstGeom>
+          <a:noFill/>
+        </p:spPr>
+        <p:txBody>
+          <a:bodyPr wrap="square" rtlCol="0">
+            <a:spAutoFit/>
+          </a:bodyPr>
+          <a:lstStyle/>
+          <a:p>
+            <a:r>
+              <a:rPr lang="en-US" dirty="0"/>
+              <a:t>Improve the performance and efficiency of the computing resources used, never waste the computing power provided.</a:t>
+            </a:r>
+          </a:p>
+          <a:p>
+            <a:r>
+              <a:rPr lang="en-US" dirty="0"/>
+              <a:t>Improve user experiences, improve programming </a:t>
+            </a:r>
+            <a:r>
+              <a:rPr lang="en-US" dirty="0" smtClean="0"/>
+              <a:t>interfaces.</a:t>
+            </a:r>
+          </a:p>
+          <a:p>
+            <a:endParaRPr lang="en-US" dirty="0"/>
+          </a:p>
+          <a:p>
+            <a:r>
+              <a:rPr lang="en-US" dirty="0" smtClean="0"/>
+              <a:t>- Amazon AWS</a:t>
+            </a:r>
+          </a:p>
+          <a:p>
+            <a:r>
+              <a:rPr lang="en-US" dirty="0" smtClean="0"/>
+              <a:t>- Google GAE</a:t>
+            </a:r>
+          </a:p>
+          <a:p>
+            <a:r>
+              <a:rPr lang="en-US" dirty="0" smtClean="0"/>
+              <a:t>- Microsoft Azure</a:t>
+            </a:r>
+          </a:p>
+          <a:p>
+            <a:r>
+              <a:rPr lang="es-419" dirty="0" smtClean="0"/>
+              <a:t>- </a:t>
+            </a:r>
+            <a:r>
+              <a:rPr lang="es-419" dirty="0" err="1" smtClean="0"/>
+              <a:t>Alibaba</a:t>
+            </a:r>
+            <a:r>
+              <a:rPr lang="es-419" dirty="0" smtClean="0"/>
+              <a:t> Cloud </a:t>
+            </a:r>
+            <a:endParaRPr lang="es-419" dirty="0"/>
+          </a:p>
+        </p:txBody>
+      </p:sp>
+      <p:pic>
+        <p:nvPicPr>
+          <p:cNvPr id="6" name="Imagen 5"/>
+          <p:cNvPicPr>
+            <a:picLocks noChangeAspect="1"/>
+          </p:cNvPicPr>
+          <p:nvPr/>
+        </p:nvPicPr>
+        <p:blipFill>
+          <a:blip r:embed="rId2">
+            <a:extLst>
+              <a:ext uri="{28A0092B-C50C-407E-A947-70E740481C1C}">
+                <a14:useLocalDpi xmlns:a14="http://schemas.microsoft.com/office/drawing/2010/main" val="0"/>
+              </a:ext>
+            </a:extLst>
+          </a:blip>
+          <a:stretch>
+            <a:fillRect/>
+          </a:stretch>
+        </p:blipFill>
+        <p:spPr>
+          <a:xfrm>
+            <a:off x="2059861" y="1729661"/>
+            <a:ext cx="7795923" cy="3598118"/>
+          </a:xfrm>
+          <a:prstGeom prst="rect">
+            <a:avLst/>
+          </a:prstGeom>
+        </p:spPr>
+      </p:pic>
+    </p:spTree>
+    <p:extLst>
+      <p:ext uri="{BB962C8B-B14F-4D97-AF65-F5344CB8AC3E}">
+        <p14:creationId xmlns:p14="http://schemas.microsoft.com/office/powerpoint/2010/main" val="321123944"/>
+      </p:ext>
+    </p:extLst>
+  </p:cSld>
+  <p:clrMapOvr>
+    <a:masterClrMapping/>
+  </p:clrMapOvr>
+</p:sld>
+</file>
+
+<file path=ppt/slides/slide8.xml><?xml version="1.0" encoding="utf-8"?>
+<p:sld xmlns:a="http://schemas.openxmlformats.org/drawingml/2006/main" xmlns:r="http://schemas.openxmlformats.org/officeDocument/2006/relationships" xmlns:p="http://schemas.openxmlformats.org/presentationml/2006/main">
+  <p:cSld>
+    <p:spTree>
+      <p:nvGrpSpPr>
+        <p:cNvPr id="1" name=""/>
+        <p:cNvGrpSpPr/>
+        <p:nvPr/>
+      </p:nvGrpSpPr>
+      <p:grpSpPr>
+        <a:xfrm>
+          <a:off x="0" y="0"/>
+          <a:ext cx="0" cy="0"/>
+          <a:chOff x="0" y="0"/>
+          <a:chExt cx="0" cy="0"/>
+        </a:xfrm>
+      </p:grpSpPr>
+      <p:sp>
+        <p:nvSpPr>
+          <p:cNvPr id="2" name="Título 1"/>
+          <p:cNvSpPr>
+            <a:spLocks noGrp="1"/>
+          </p:cNvSpPr>
+          <p:nvPr>
+            <p:ph type="title"/>
+          </p:nvPr>
+        </p:nvSpPr>
+        <p:spPr/>
+        <p:txBody>
+          <a:bodyPr/>
+          <a:lstStyle/>
+          <a:p>
+            <a:r>
+              <a:rPr lang="es-ES_tradnl" dirty="0" smtClean="0"/>
+              <a:t>UNIX</a:t>
+            </a:r>
+            <a:endParaRPr lang="es-ES_tradnl" dirty="0"/>
+          </a:p>
+        </p:txBody>
+      </p:sp>
+      <p:sp>
+        <p:nvSpPr>
+          <p:cNvPr id="4" name="Marcador de fecha 3"/>
+          <p:cNvSpPr>
+            <a:spLocks noGrp="1"/>
+          </p:cNvSpPr>
+          <p:nvPr>
+            <p:ph type="dt" sz="half" idx="10"/>
+          </p:nvPr>
+        </p:nvSpPr>
+        <p:spPr/>
+        <p:txBody>
+          <a:bodyPr/>
+          <a:lstStyle/>
+          <a:p>
+            <a:fld id="{35ACACDB-EA2E-354D-B6B5-978EAE165E52}" type="datetime3">
+              <a:t>27.2.23</a:t>
+            </a:fld>
+            <a:endParaRPr lang="es-ES_tradnl"/>
+          </a:p>
+        </p:txBody>
+      </p:sp>
+      <p:sp>
+        <p:nvSpPr>
+          <p:cNvPr id="5" name="Marcador de número de diapositiva 4"/>
+          <p:cNvSpPr>
+            <a:spLocks noGrp="1"/>
+          </p:cNvSpPr>
+          <p:nvPr>
+            <p:ph type="sldNum" sz="quarter" idx="12"/>
+          </p:nvPr>
+        </p:nvSpPr>
+        <p:spPr/>
+        <p:txBody>
+          <a:bodyPr/>
+          <a:lstStyle/>
+          <a:p>
+            <a:fld id="{47E163D4-D484-AC4B-B1E7-22F25D50FAE6}" type="slidenum">
+              <a:t>8</a:t>
+            </a:fld>
+            <a:endParaRPr lang="es-ES_tradnl"/>
+          </a:p>
+        </p:txBody>
+      </p:sp>
+      <p:sp>
+        <p:nvSpPr>
+          <p:cNvPr id="10" name="CuadroTexto 9"/>
+          <p:cNvSpPr txBox="1"/>
+          <p:nvPr/>
+        </p:nvSpPr>
+        <p:spPr>
+          <a:xfrm>
+            <a:off x="2622125" y="1431654"/>
+            <a:ext cx="4758612" cy="461665"/>
+          </a:xfrm>
+          <a:prstGeom prst="rect">
+            <a:avLst/>
+          </a:prstGeom>
+          <a:noFill/>
+        </p:spPr>
+        <p:txBody>
+          <a:bodyPr wrap="square" rtlCol="0">
+            <a:spAutoFit/>
+          </a:bodyPr>
+          <a:lstStyle/>
+          <a:p>
+            <a:r>
+              <a:rPr lang="en-US" sz="2400" b="1" dirty="0"/>
+              <a:t>Architecture of the cloud OS</a:t>
+            </a:r>
+            <a:r>
+              <a:rPr lang="en-US" sz="2000" b="1" dirty="0"/>
+              <a:t>.</a:t>
+            </a:r>
+            <a:endParaRPr lang="es-419" sz="2000" b="1" dirty="0"/>
+          </a:p>
+        </p:txBody>
+      </p:sp>
+      <p:pic>
+        <p:nvPicPr>
+          <p:cNvPr id="3" name="Imagen 2"/>
+          <p:cNvPicPr>
+            <a:picLocks noChangeAspect="1"/>
+          </p:cNvPicPr>
+          <p:nvPr/>
+        </p:nvPicPr>
+        <p:blipFill>
+          <a:blip r:embed="rId2"/>
+          <a:stretch>
+            <a:fillRect/>
+          </a:stretch>
+        </p:blipFill>
+        <p:spPr>
+          <a:xfrm>
+            <a:off x="1281960" y="1893319"/>
+            <a:ext cx="6444010" cy="4145104"/>
+          </a:xfrm>
+          <a:prstGeom prst="rect">
+            <a:avLst/>
+          </a:prstGeom>
+        </p:spPr>
+      </p:pic>
+    </p:spTree>
+    <p:extLst>
+      <p:ext uri="{BB962C8B-B14F-4D97-AF65-F5344CB8AC3E}">
+        <p14:creationId xmlns:p14="http://schemas.microsoft.com/office/powerpoint/2010/main" val="2924426941"/>
+      </p:ext>
+    </p:extLst>
+  </p:cSld>
+  <p:clrMapOvr>
+    <a:masterClrMapping/>
+  </p:clrMapOvr>
+</p:sld>
+</file>
+
+<file path=ppt/slides/slide9.xml><?xml version="1.0" encoding="utf-8"?>
+<p:sld xmlns:a="http://schemas.openxmlformats.org/drawingml/2006/main" xmlns:r="http://schemas.openxmlformats.org/officeDocument/2006/relationships" xmlns:p="http://schemas.openxmlformats.org/presentationml/2006/main">
+  <p:cSld>
+    <p:spTree>
+      <p:nvGrpSpPr>
+        <p:cNvPr id="1" name=""/>
+        <p:cNvGrpSpPr/>
+        <p:nvPr/>
+      </p:nvGrpSpPr>
+      <p:grpSpPr>
+        <a:xfrm>
+          <a:off x="0" y="0"/>
+          <a:ext cx="0" cy="0"/>
+          <a:chOff x="0" y="0"/>
+          <a:chExt cx="0" cy="0"/>
+        </a:xfrm>
+      </p:grpSpPr>
+      <p:sp>
+        <p:nvSpPr>
           <p:cNvPr id="2" name="Marcador de fecha 1"/>
           <p:cNvSpPr>
             <a:spLocks noGrp="1"/>
@@ -4819,7 +5526,7 @@
           <a:lstStyle/>
           <a:p>
             <a:fld id="{456E474B-3F58-9C40-A6B3-4A73416EC76F}" type="datetime3">
-              <a:t>26.2.23</a:t>
+              <a:t>27.2.23</a:t>
             </a:fld>
             <a:endParaRPr lang="es-ES_tradnl"/>
           </a:p>
@@ -4843,7 +5550,7 @@
             <a:fld id="{47E163D4-D484-AC4B-B1E7-22F25D50FAE6}" type="slidenum">
               <a:rPr lang="es-ES_tradnl"/>
               <a:pPr/>
-              <a:t>6</a:t>
+              <a:t>9</a:t>
             </a:fld>
             <a:endParaRPr lang="es-ES_tradnl"/>
           </a:p>

</xml_diff>